<commit_message>
Updated interface grafics & reworked the adjust speed command sequence in chuck.py - still needs work
</commit_message>
<xml_diff>
--- a/Images/Graphics.pptx
+++ b/Images/Graphics.pptx
@@ -6,6 +6,8 @@
   </p:sldMasterIdLst>
   <p:sldIdLst>
     <p:sldId id="256" r:id="rId2"/>
+    <p:sldId id="257" r:id="rId3"/>
+    <p:sldId id="258" r:id="rId4"/>
   </p:sldIdLst>
   <p:sldSz cx="9144000" cy="6858000" type="screen4x3"/>
   <p:notesSz cx="6858000" cy="9144000"/>
@@ -288,7 +290,7 @@
           <a:p>
             <a:fld id="{C31ADA8B-A60D-F344-8A5E-B3BEC675E517}" type="datetimeFigureOut">
               <a:rPr lang="en-US" smtClean="0"/>
-              <a:t>1/9/15</a:t>
+              <a:t>1/27/15</a:t>
             </a:fld>
             <a:endParaRPr lang="en-US"/>
           </a:p>
@@ -458,7 +460,7 @@
           <a:p>
             <a:fld id="{C31ADA8B-A60D-F344-8A5E-B3BEC675E517}" type="datetimeFigureOut">
               <a:rPr lang="en-US" smtClean="0"/>
-              <a:t>1/9/15</a:t>
+              <a:t>1/27/15</a:t>
             </a:fld>
             <a:endParaRPr lang="en-US"/>
           </a:p>
@@ -638,7 +640,7 @@
           <a:p>
             <a:fld id="{C31ADA8B-A60D-F344-8A5E-B3BEC675E517}" type="datetimeFigureOut">
               <a:rPr lang="en-US" smtClean="0"/>
-              <a:t>1/9/15</a:t>
+              <a:t>1/27/15</a:t>
             </a:fld>
             <a:endParaRPr lang="en-US"/>
           </a:p>
@@ -808,7 +810,7 @@
           <a:p>
             <a:fld id="{C31ADA8B-A60D-F344-8A5E-B3BEC675E517}" type="datetimeFigureOut">
               <a:rPr lang="en-US" smtClean="0"/>
-              <a:t>1/9/15</a:t>
+              <a:t>1/27/15</a:t>
             </a:fld>
             <a:endParaRPr lang="en-US"/>
           </a:p>
@@ -1054,7 +1056,7 @@
           <a:p>
             <a:fld id="{C31ADA8B-A60D-F344-8A5E-B3BEC675E517}" type="datetimeFigureOut">
               <a:rPr lang="en-US" smtClean="0"/>
-              <a:t>1/9/15</a:t>
+              <a:t>1/27/15</a:t>
             </a:fld>
             <a:endParaRPr lang="en-US"/>
           </a:p>
@@ -1342,7 +1344,7 @@
           <a:p>
             <a:fld id="{C31ADA8B-A60D-F344-8A5E-B3BEC675E517}" type="datetimeFigureOut">
               <a:rPr lang="en-US" smtClean="0"/>
-              <a:t>1/9/15</a:t>
+              <a:t>1/27/15</a:t>
             </a:fld>
             <a:endParaRPr lang="en-US"/>
           </a:p>
@@ -1764,7 +1766,7 @@
           <a:p>
             <a:fld id="{C31ADA8B-A60D-F344-8A5E-B3BEC675E517}" type="datetimeFigureOut">
               <a:rPr lang="en-US" smtClean="0"/>
-              <a:t>1/9/15</a:t>
+              <a:t>1/27/15</a:t>
             </a:fld>
             <a:endParaRPr lang="en-US"/>
           </a:p>
@@ -1882,7 +1884,7 @@
           <a:p>
             <a:fld id="{C31ADA8B-A60D-F344-8A5E-B3BEC675E517}" type="datetimeFigureOut">
               <a:rPr lang="en-US" smtClean="0"/>
-              <a:t>1/9/15</a:t>
+              <a:t>1/27/15</a:t>
             </a:fld>
             <a:endParaRPr lang="en-US"/>
           </a:p>
@@ -1977,7 +1979,7 @@
           <a:p>
             <a:fld id="{C31ADA8B-A60D-F344-8A5E-B3BEC675E517}" type="datetimeFigureOut">
               <a:rPr lang="en-US" smtClean="0"/>
-              <a:t>1/9/15</a:t>
+              <a:t>1/27/15</a:t>
             </a:fld>
             <a:endParaRPr lang="en-US"/>
           </a:p>
@@ -2254,7 +2256,7 @@
           <a:p>
             <a:fld id="{C31ADA8B-A60D-F344-8A5E-B3BEC675E517}" type="datetimeFigureOut">
               <a:rPr lang="en-US" smtClean="0"/>
-              <a:t>1/9/15</a:t>
+              <a:t>1/27/15</a:t>
             </a:fld>
             <a:endParaRPr lang="en-US"/>
           </a:p>
@@ -2507,7 +2509,7 @@
           <a:p>
             <a:fld id="{C31ADA8B-A60D-F344-8A5E-B3BEC675E517}" type="datetimeFigureOut">
               <a:rPr lang="en-US" smtClean="0"/>
-              <a:t>1/9/15</a:t>
+              <a:t>1/27/15</a:t>
             </a:fld>
             <a:endParaRPr lang="en-US"/>
           </a:p>
@@ -2720,7 +2722,7 @@
           <a:p>
             <a:fld id="{C31ADA8B-A60D-F344-8A5E-B3BEC675E517}" type="datetimeFigureOut">
               <a:rPr lang="en-US" smtClean="0"/>
-              <a:t>1/9/15</a:t>
+              <a:t>1/27/15</a:t>
             </a:fld>
             <a:endParaRPr lang="en-US"/>
           </a:p>
@@ -3574,6 +3576,931 @@
 </p:sld>
 </file>
 
+<file path=ppt/slides/slide2.xml><?xml version="1.0" encoding="utf-8"?>
+<p:sld xmlns:a="http://schemas.openxmlformats.org/drawingml/2006/main" xmlns:r="http://schemas.openxmlformats.org/officeDocument/2006/relationships" xmlns:p="http://schemas.openxmlformats.org/presentationml/2006/main">
+  <p:cSld>
+    <p:spTree>
+      <p:nvGrpSpPr>
+        <p:cNvPr id="1" name=""/>
+        <p:cNvGrpSpPr/>
+        <p:nvPr/>
+      </p:nvGrpSpPr>
+      <p:grpSpPr>
+        <a:xfrm>
+          <a:off x="0" y="0"/>
+          <a:ext cx="0" cy="0"/>
+          <a:chOff x="0" y="0"/>
+          <a:chExt cx="0" cy="0"/>
+        </a:xfrm>
+      </p:grpSpPr>
+      <p:grpSp>
+        <p:nvGrpSpPr>
+          <p:cNvPr id="14" name="Group 13"/>
+          <p:cNvGrpSpPr/>
+          <p:nvPr/>
+        </p:nvGrpSpPr>
+        <p:grpSpPr>
+          <a:xfrm>
+            <a:off x="0" y="1244600"/>
+            <a:ext cx="13893800" cy="4176210"/>
+            <a:chOff x="0" y="1244600"/>
+            <a:chExt cx="13893800" cy="4176210"/>
+          </a:xfrm>
+        </p:grpSpPr>
+        <p:sp>
+          <p:nvSpPr>
+            <p:cNvPr id="4" name="Rectangle 3"/>
+            <p:cNvSpPr/>
+            <p:nvPr/>
+          </p:nvSpPr>
+          <p:spPr>
+            <a:xfrm>
+              <a:off x="0" y="2578346"/>
+              <a:ext cx="11353800" cy="2376766"/>
+            </a:xfrm>
+            <a:prstGeom prst="rect">
+              <a:avLst/>
+            </a:prstGeom>
+            <a:solidFill>
+              <a:schemeClr val="bg1">
+                <a:lumMod val="75000"/>
+              </a:schemeClr>
+            </a:solidFill>
+            <a:ln w="57150" cmpd="sng">
+              <a:solidFill>
+                <a:schemeClr val="tx1"/>
+              </a:solidFill>
+            </a:ln>
+            <a:effectLst/>
+          </p:spPr>
+          <p:style>
+            <a:lnRef idx="1">
+              <a:schemeClr val="accent1"/>
+            </a:lnRef>
+            <a:fillRef idx="3">
+              <a:schemeClr val="accent1"/>
+            </a:fillRef>
+            <a:effectRef idx="2">
+              <a:schemeClr val="accent1"/>
+            </a:effectRef>
+            <a:fontRef idx="minor">
+              <a:schemeClr val="lt1"/>
+            </a:fontRef>
+          </p:style>
+          <p:txBody>
+            <a:bodyPr rtlCol="0" anchor="ctr"/>
+            <a:lstStyle/>
+            <a:p>
+              <a:pPr algn="ctr"/>
+              <a:endParaRPr lang="en-US"/>
+            </a:p>
+          </p:txBody>
+        </p:sp>
+        <p:sp>
+          <p:nvSpPr>
+            <p:cNvPr id="7" name="Rectangle 6"/>
+            <p:cNvSpPr/>
+            <p:nvPr/>
+          </p:nvSpPr>
+          <p:spPr>
+            <a:xfrm>
+              <a:off x="11353800" y="1985029"/>
+              <a:ext cx="2540000" cy="3435781"/>
+            </a:xfrm>
+            <a:prstGeom prst="rect">
+              <a:avLst/>
+            </a:prstGeom>
+            <a:solidFill>
+              <a:schemeClr val="bg1">
+                <a:lumMod val="50000"/>
+              </a:schemeClr>
+            </a:solidFill>
+            <a:ln w="57150" cmpd="sng">
+              <a:solidFill>
+                <a:schemeClr val="tx1"/>
+              </a:solidFill>
+            </a:ln>
+            <a:effectLst/>
+          </p:spPr>
+          <p:style>
+            <a:lnRef idx="1">
+              <a:schemeClr val="accent1"/>
+            </a:lnRef>
+            <a:fillRef idx="3">
+              <a:schemeClr val="accent1"/>
+            </a:fillRef>
+            <a:effectRef idx="2">
+              <a:schemeClr val="accent1"/>
+            </a:effectRef>
+            <a:fontRef idx="minor">
+              <a:schemeClr val="lt1"/>
+            </a:fontRef>
+          </p:style>
+          <p:txBody>
+            <a:bodyPr rtlCol="0" anchor="ctr"/>
+            <a:lstStyle/>
+            <a:p>
+              <a:pPr algn="ctr"/>
+              <a:endParaRPr lang="en-US"/>
+            </a:p>
+          </p:txBody>
+        </p:sp>
+        <p:grpSp>
+          <p:nvGrpSpPr>
+            <p:cNvPr id="9" name="Group 8"/>
+            <p:cNvGrpSpPr/>
+            <p:nvPr/>
+          </p:nvGrpSpPr>
+          <p:grpSpPr>
+            <a:xfrm>
+              <a:off x="8909094" y="1244600"/>
+              <a:ext cx="594510" cy="1333746"/>
+              <a:chOff x="5296645" y="787095"/>
+              <a:chExt cx="594510" cy="1791251"/>
+            </a:xfrm>
+          </p:grpSpPr>
+          <p:sp>
+            <p:nvSpPr>
+              <p:cNvPr id="6" name="Rectangle 5"/>
+              <p:cNvSpPr/>
+              <p:nvPr/>
+            </p:nvSpPr>
+            <p:spPr>
+              <a:xfrm>
+                <a:off x="5296645" y="787095"/>
+                <a:ext cx="594510" cy="1791251"/>
+              </a:xfrm>
+              <a:prstGeom prst="rect">
+                <a:avLst/>
+              </a:prstGeom>
+              <a:solidFill>
+                <a:schemeClr val="bg1">
+                  <a:lumMod val="75000"/>
+                </a:schemeClr>
+              </a:solidFill>
+              <a:ln w="57150" cmpd="sng">
+                <a:solidFill>
+                  <a:schemeClr val="tx1"/>
+                </a:solidFill>
+              </a:ln>
+              <a:effectLst/>
+            </p:spPr>
+            <p:style>
+              <a:lnRef idx="1">
+                <a:schemeClr val="accent1"/>
+              </a:lnRef>
+              <a:fillRef idx="3">
+                <a:schemeClr val="accent1"/>
+              </a:fillRef>
+              <a:effectRef idx="2">
+                <a:schemeClr val="accent1"/>
+              </a:effectRef>
+              <a:fontRef idx="minor">
+                <a:schemeClr val="lt1"/>
+              </a:fontRef>
+            </p:style>
+            <p:txBody>
+              <a:bodyPr rtlCol="0" anchor="ctr"/>
+              <a:lstStyle/>
+              <a:p>
+                <a:pPr algn="ctr"/>
+                <a:endParaRPr lang="en-US"/>
+              </a:p>
+            </p:txBody>
+          </p:sp>
+          <p:sp>
+            <p:nvSpPr>
+              <p:cNvPr id="8" name="Rectangle 7"/>
+              <p:cNvSpPr/>
+              <p:nvPr/>
+            </p:nvSpPr>
+            <p:spPr>
+              <a:xfrm>
+                <a:off x="5296645" y="787095"/>
+                <a:ext cx="594510" cy="1791251"/>
+              </a:xfrm>
+              <a:prstGeom prst="rect">
+                <a:avLst/>
+              </a:prstGeom>
+              <a:solidFill>
+                <a:schemeClr val="accent2">
+                  <a:lumMod val="60000"/>
+                  <a:lumOff val="40000"/>
+                  <a:alpha val="74000"/>
+                </a:schemeClr>
+              </a:solidFill>
+              <a:ln w="57150" cmpd="sng">
+                <a:noFill/>
+              </a:ln>
+              <a:effectLst/>
+            </p:spPr>
+            <p:style>
+              <a:lnRef idx="1">
+                <a:schemeClr val="accent1"/>
+              </a:lnRef>
+              <a:fillRef idx="3">
+                <a:schemeClr val="accent1"/>
+              </a:fillRef>
+              <a:effectRef idx="2">
+                <a:schemeClr val="accent1"/>
+              </a:effectRef>
+              <a:fontRef idx="minor">
+                <a:schemeClr val="lt1"/>
+              </a:fontRef>
+            </p:style>
+            <p:txBody>
+              <a:bodyPr rtlCol="0" anchor="ctr"/>
+              <a:lstStyle/>
+              <a:p>
+                <a:pPr algn="ctr"/>
+                <a:endParaRPr lang="en-US"/>
+              </a:p>
+            </p:txBody>
+          </p:sp>
+        </p:grpSp>
+        <p:sp>
+          <p:nvSpPr>
+            <p:cNvPr id="10" name="Oval 9"/>
+            <p:cNvSpPr>
+              <a:spLocks noChangeAspect="1"/>
+            </p:cNvSpPr>
+            <p:nvPr/>
+          </p:nvSpPr>
+          <p:spPr>
+            <a:xfrm>
+              <a:off x="9036201" y="2785294"/>
+              <a:ext cx="417086" cy="416890"/>
+            </a:xfrm>
+            <a:prstGeom prst="ellipse">
+              <a:avLst/>
+            </a:prstGeom>
+            <a:solidFill>
+              <a:schemeClr val="bg1">
+                <a:lumMod val="50000"/>
+              </a:schemeClr>
+            </a:solidFill>
+            <a:ln w="57150" cmpd="sng">
+              <a:solidFill>
+                <a:schemeClr val="tx1"/>
+              </a:solidFill>
+            </a:ln>
+            <a:effectLst/>
+          </p:spPr>
+          <p:style>
+            <a:lnRef idx="1">
+              <a:schemeClr val="accent1"/>
+            </a:lnRef>
+            <a:fillRef idx="3">
+              <a:schemeClr val="accent1"/>
+            </a:fillRef>
+            <a:effectRef idx="2">
+              <a:schemeClr val="accent1"/>
+            </a:effectRef>
+            <a:fontRef idx="minor">
+              <a:schemeClr val="lt1"/>
+            </a:fontRef>
+          </p:style>
+          <p:txBody>
+            <a:bodyPr rtlCol="0" anchor="ctr"/>
+            <a:lstStyle/>
+            <a:p>
+              <a:pPr algn="ctr"/>
+              <a:endParaRPr lang="en-US"/>
+            </a:p>
+          </p:txBody>
+        </p:sp>
+        <p:grpSp>
+          <p:nvGrpSpPr>
+            <p:cNvPr id="13" name="Group 12"/>
+            <p:cNvGrpSpPr/>
+            <p:nvPr/>
+          </p:nvGrpSpPr>
+          <p:grpSpPr>
+            <a:xfrm>
+              <a:off x="5328298" y="2880058"/>
+              <a:ext cx="823249" cy="822862"/>
+              <a:chOff x="3143898" y="2880058"/>
+              <a:chExt cx="823249" cy="822862"/>
+            </a:xfrm>
+          </p:grpSpPr>
+          <p:sp>
+            <p:nvSpPr>
+              <p:cNvPr id="11" name="Rectangle 10"/>
+              <p:cNvSpPr/>
+              <p:nvPr/>
+            </p:nvSpPr>
+            <p:spPr>
+              <a:xfrm>
+                <a:off x="3143898" y="2880058"/>
+                <a:ext cx="823249" cy="822862"/>
+              </a:xfrm>
+              <a:prstGeom prst="rect">
+                <a:avLst/>
+              </a:prstGeom>
+              <a:solidFill>
+                <a:schemeClr val="bg1">
+                  <a:lumMod val="50000"/>
+                </a:schemeClr>
+              </a:solidFill>
+              <a:ln w="57150" cmpd="sng">
+                <a:solidFill>
+                  <a:schemeClr val="tx1"/>
+                </a:solidFill>
+              </a:ln>
+              <a:effectLst/>
+            </p:spPr>
+            <p:style>
+              <a:lnRef idx="1">
+                <a:schemeClr val="accent1"/>
+              </a:lnRef>
+              <a:fillRef idx="3">
+                <a:schemeClr val="accent1"/>
+              </a:fillRef>
+              <a:effectRef idx="2">
+                <a:schemeClr val="accent1"/>
+              </a:effectRef>
+              <a:fontRef idx="minor">
+                <a:schemeClr val="lt1"/>
+              </a:fontRef>
+            </p:style>
+            <p:txBody>
+              <a:bodyPr rtlCol="0" anchor="ctr"/>
+              <a:lstStyle/>
+              <a:p>
+                <a:pPr algn="ctr"/>
+                <a:endParaRPr lang="en-US"/>
+              </a:p>
+            </p:txBody>
+          </p:sp>
+          <p:sp>
+            <p:nvSpPr>
+              <p:cNvPr id="5" name="Oval 4"/>
+              <p:cNvSpPr>
+                <a:spLocks noChangeAspect="1"/>
+              </p:cNvSpPr>
+              <p:nvPr/>
+            </p:nvSpPr>
+            <p:spPr>
+              <a:xfrm>
+                <a:off x="3143898" y="2880058"/>
+                <a:ext cx="823249" cy="822862"/>
+              </a:xfrm>
+              <a:prstGeom prst="ellipse">
+                <a:avLst/>
+              </a:prstGeom>
+              <a:solidFill>
+                <a:schemeClr val="bg1">
+                  <a:lumMod val="50000"/>
+                </a:schemeClr>
+              </a:solidFill>
+              <a:ln w="57150" cmpd="sng">
+                <a:solidFill>
+                  <a:schemeClr val="tx1"/>
+                </a:solidFill>
+              </a:ln>
+              <a:effectLst/>
+            </p:spPr>
+            <p:style>
+              <a:lnRef idx="1">
+                <a:schemeClr val="accent1"/>
+              </a:lnRef>
+              <a:fillRef idx="3">
+                <a:schemeClr val="accent1"/>
+              </a:fillRef>
+              <a:effectRef idx="2">
+                <a:schemeClr val="accent1"/>
+              </a:effectRef>
+              <a:fontRef idx="minor">
+                <a:schemeClr val="lt1"/>
+              </a:fontRef>
+            </p:style>
+            <p:txBody>
+              <a:bodyPr rtlCol="0" anchor="ctr"/>
+              <a:lstStyle/>
+              <a:p>
+                <a:pPr algn="ctr"/>
+                <a:endParaRPr lang="en-US"/>
+              </a:p>
+            </p:txBody>
+          </p:sp>
+        </p:grpSp>
+      </p:grpSp>
+    </p:spTree>
+    <p:extLst>
+      <p:ext uri="{BB962C8B-B14F-4D97-AF65-F5344CB8AC3E}">
+        <p14:creationId xmlns:p14="http://schemas.microsoft.com/office/powerpoint/2010/main" val="2755817782"/>
+      </p:ext>
+    </p:extLst>
+  </p:cSld>
+  <p:clrMapOvr>
+    <a:masterClrMapping/>
+  </p:clrMapOvr>
+</p:sld>
+</file>
+
+<file path=ppt/slides/slide3.xml><?xml version="1.0" encoding="utf-8"?>
+<p:sld xmlns:a="http://schemas.openxmlformats.org/drawingml/2006/main" xmlns:r="http://schemas.openxmlformats.org/officeDocument/2006/relationships" xmlns:p="http://schemas.openxmlformats.org/presentationml/2006/main">
+  <p:cSld>
+    <p:spTree>
+      <p:nvGrpSpPr>
+        <p:cNvPr id="1" name=""/>
+        <p:cNvGrpSpPr/>
+        <p:nvPr/>
+      </p:nvGrpSpPr>
+      <p:grpSpPr>
+        <a:xfrm>
+          <a:off x="0" y="0"/>
+          <a:ext cx="0" cy="0"/>
+          <a:chOff x="0" y="0"/>
+          <a:chExt cx="0" cy="0"/>
+        </a:xfrm>
+      </p:grpSpPr>
+      <p:grpSp>
+        <p:nvGrpSpPr>
+          <p:cNvPr id="8" name="Group 7"/>
+          <p:cNvGrpSpPr/>
+          <p:nvPr/>
+        </p:nvGrpSpPr>
+        <p:grpSpPr>
+          <a:xfrm>
+            <a:off x="2824485" y="1247904"/>
+            <a:ext cx="2743200" cy="2743200"/>
+            <a:chOff x="2824485" y="1247904"/>
+            <a:chExt cx="2743200" cy="2743200"/>
+          </a:xfrm>
+        </p:grpSpPr>
+        <p:sp>
+          <p:nvSpPr>
+            <p:cNvPr id="7" name="Rectangle 6"/>
+            <p:cNvSpPr/>
+            <p:nvPr/>
+          </p:nvSpPr>
+          <p:spPr>
+            <a:xfrm>
+              <a:off x="2824485" y="1247904"/>
+              <a:ext cx="2743200" cy="2743200"/>
+            </a:xfrm>
+            <a:prstGeom prst="rect">
+              <a:avLst/>
+            </a:prstGeom>
+            <a:noFill/>
+            <a:ln w="57150" cmpd="sng">
+              <a:noFill/>
+            </a:ln>
+            <a:effectLst/>
+          </p:spPr>
+          <p:style>
+            <a:lnRef idx="1">
+              <a:schemeClr val="accent1"/>
+            </a:lnRef>
+            <a:fillRef idx="3">
+              <a:schemeClr val="accent1"/>
+            </a:fillRef>
+            <a:effectRef idx="2">
+              <a:schemeClr val="accent1"/>
+            </a:effectRef>
+            <a:fontRef idx="minor">
+              <a:schemeClr val="lt1"/>
+            </a:fontRef>
+          </p:style>
+          <p:txBody>
+            <a:bodyPr rtlCol="0" anchor="ctr"/>
+            <a:lstStyle/>
+            <a:p>
+              <a:pPr algn="ctr"/>
+              <a:endParaRPr lang="en-US"/>
+            </a:p>
+          </p:txBody>
+        </p:sp>
+        <p:grpSp>
+          <p:nvGrpSpPr>
+            <p:cNvPr id="4" name="Group 3"/>
+            <p:cNvGrpSpPr/>
+            <p:nvPr/>
+          </p:nvGrpSpPr>
+          <p:grpSpPr>
+            <a:xfrm>
+              <a:off x="2824485" y="1247904"/>
+              <a:ext cx="2743200" cy="2743200"/>
+              <a:chOff x="2824485" y="1247904"/>
+              <a:chExt cx="2743200" cy="2743200"/>
+            </a:xfrm>
+          </p:grpSpPr>
+          <p:sp>
+            <p:nvSpPr>
+              <p:cNvPr id="5" name="Oval 4"/>
+              <p:cNvSpPr/>
+              <p:nvPr/>
+            </p:nvSpPr>
+            <p:spPr>
+              <a:xfrm>
+                <a:off x="2824485" y="1247904"/>
+                <a:ext cx="2743200" cy="2743200"/>
+              </a:xfrm>
+              <a:prstGeom prst="ellipse">
+                <a:avLst/>
+              </a:prstGeom>
+              <a:blipFill rotWithShape="1">
+                <a:blip r:embed="rId2"/>
+                <a:stretch>
+                  <a:fillRect/>
+                </a:stretch>
+              </a:blipFill>
+              <a:ln w="28575" cmpd="sng">
+                <a:solidFill>
+                  <a:schemeClr val="tx1"/>
+                </a:solidFill>
+              </a:ln>
+              <a:effectLst/>
+            </p:spPr>
+            <p:style>
+              <a:lnRef idx="1">
+                <a:schemeClr val="accent1"/>
+              </a:lnRef>
+              <a:fillRef idx="3">
+                <a:schemeClr val="accent1"/>
+              </a:fillRef>
+              <a:effectRef idx="2">
+                <a:schemeClr val="accent1"/>
+              </a:effectRef>
+              <a:fontRef idx="minor">
+                <a:schemeClr val="lt1"/>
+              </a:fontRef>
+            </p:style>
+            <p:txBody>
+              <a:bodyPr rtlCol="0" anchor="ctr"/>
+              <a:lstStyle/>
+              <a:p>
+                <a:pPr algn="ctr"/>
+                <a:endParaRPr lang="en-US"/>
+              </a:p>
+            </p:txBody>
+          </p:sp>
+          <p:sp>
+            <p:nvSpPr>
+              <p:cNvPr id="6" name="Oval 5"/>
+              <p:cNvSpPr/>
+              <p:nvPr/>
+            </p:nvSpPr>
+            <p:spPr>
+              <a:xfrm>
+                <a:off x="2977750" y="1401155"/>
+                <a:ext cx="2431240" cy="2452023"/>
+              </a:xfrm>
+              <a:prstGeom prst="ellipse">
+                <a:avLst/>
+              </a:prstGeom>
+              <a:blipFill rotWithShape="1">
+                <a:blip r:embed="rId2"/>
+                <a:stretch>
+                  <a:fillRect/>
+                </a:stretch>
+              </a:blipFill>
+              <a:ln w="28575" cmpd="sng">
+                <a:solidFill>
+                  <a:schemeClr val="tx1"/>
+                </a:solidFill>
+              </a:ln>
+              <a:effectLst/>
+            </p:spPr>
+            <p:style>
+              <a:lnRef idx="1">
+                <a:schemeClr val="accent1"/>
+              </a:lnRef>
+              <a:fillRef idx="3">
+                <a:schemeClr val="accent1"/>
+              </a:fillRef>
+              <a:effectRef idx="2">
+                <a:schemeClr val="accent1"/>
+              </a:effectRef>
+              <a:fontRef idx="minor">
+                <a:schemeClr val="lt1"/>
+              </a:fontRef>
+            </p:style>
+            <p:txBody>
+              <a:bodyPr rtlCol="0" anchor="ctr"/>
+              <a:lstStyle/>
+              <a:p>
+                <a:pPr algn="ctr"/>
+                <a:endParaRPr lang="en-US" sz="3200" dirty="0" smtClean="0">
+                  <a:solidFill>
+                    <a:schemeClr val="tx1"/>
+                  </a:solidFill>
+                </a:endParaRPr>
+              </a:p>
+              <a:p>
+                <a:pPr algn="ctr"/>
+                <a:endParaRPr lang="en-US" sz="3200" dirty="0">
+                  <a:solidFill>
+                    <a:schemeClr val="tx1"/>
+                  </a:solidFill>
+                </a:endParaRPr>
+              </a:p>
+            </p:txBody>
+          </p:sp>
+        </p:grpSp>
+      </p:grpSp>
+      <p:grpSp>
+        <p:nvGrpSpPr>
+          <p:cNvPr id="15" name="Group 14"/>
+          <p:cNvGrpSpPr/>
+          <p:nvPr/>
+        </p:nvGrpSpPr>
+        <p:grpSpPr>
+          <a:xfrm>
+            <a:off x="6553200" y="1247904"/>
+            <a:ext cx="2743200" cy="2743200"/>
+            <a:chOff x="6781800" y="1262378"/>
+            <a:chExt cx="2743200" cy="2743200"/>
+          </a:xfrm>
+        </p:grpSpPr>
+        <p:grpSp>
+          <p:nvGrpSpPr>
+            <p:cNvPr id="9" name="Group 8"/>
+            <p:cNvGrpSpPr/>
+            <p:nvPr/>
+          </p:nvGrpSpPr>
+          <p:grpSpPr>
+            <a:xfrm>
+              <a:off x="6781800" y="1262378"/>
+              <a:ext cx="2743200" cy="2743200"/>
+              <a:chOff x="2824485" y="1247904"/>
+              <a:chExt cx="2743200" cy="2743200"/>
+            </a:xfrm>
+          </p:grpSpPr>
+          <p:sp>
+            <p:nvSpPr>
+              <p:cNvPr id="10" name="Rectangle 9"/>
+              <p:cNvSpPr/>
+              <p:nvPr/>
+            </p:nvSpPr>
+            <p:spPr>
+              <a:xfrm>
+                <a:off x="2824485" y="1247904"/>
+                <a:ext cx="2743200" cy="2743200"/>
+              </a:xfrm>
+              <a:prstGeom prst="rect">
+                <a:avLst/>
+              </a:prstGeom>
+              <a:noFill/>
+              <a:ln w="57150" cmpd="sng">
+                <a:noFill/>
+              </a:ln>
+              <a:effectLst/>
+            </p:spPr>
+            <p:style>
+              <a:lnRef idx="1">
+                <a:schemeClr val="accent1"/>
+              </a:lnRef>
+              <a:fillRef idx="3">
+                <a:schemeClr val="accent1"/>
+              </a:fillRef>
+              <a:effectRef idx="2">
+                <a:schemeClr val="accent1"/>
+              </a:effectRef>
+              <a:fontRef idx="minor">
+                <a:schemeClr val="lt1"/>
+              </a:fontRef>
+            </p:style>
+            <p:txBody>
+              <a:bodyPr rtlCol="0" anchor="ctr"/>
+              <a:lstStyle/>
+              <a:p>
+                <a:pPr algn="ctr"/>
+                <a:endParaRPr lang="en-US"/>
+              </a:p>
+            </p:txBody>
+          </p:sp>
+          <p:grpSp>
+            <p:nvGrpSpPr>
+              <p:cNvPr id="11" name="Group 10"/>
+              <p:cNvGrpSpPr/>
+              <p:nvPr/>
+            </p:nvGrpSpPr>
+            <p:grpSpPr>
+              <a:xfrm>
+                <a:off x="2824485" y="1247904"/>
+                <a:ext cx="2743200" cy="2743200"/>
+                <a:chOff x="2824485" y="1247904"/>
+                <a:chExt cx="2743200" cy="2743200"/>
+              </a:xfrm>
+            </p:grpSpPr>
+            <p:sp>
+              <p:nvSpPr>
+                <p:cNvPr id="12" name="Oval 11"/>
+                <p:cNvSpPr/>
+                <p:nvPr/>
+              </p:nvSpPr>
+              <p:spPr>
+                <a:xfrm>
+                  <a:off x="2824485" y="1247904"/>
+                  <a:ext cx="2743200" cy="2743200"/>
+                </a:xfrm>
+                <a:prstGeom prst="ellipse">
+                  <a:avLst/>
+                </a:prstGeom>
+                <a:blipFill rotWithShape="1">
+                  <a:blip r:embed="rId2"/>
+                  <a:stretch>
+                    <a:fillRect/>
+                  </a:stretch>
+                </a:blipFill>
+                <a:ln w="28575" cmpd="sng">
+                  <a:solidFill>
+                    <a:schemeClr val="tx1"/>
+                  </a:solidFill>
+                </a:ln>
+                <a:effectLst/>
+              </p:spPr>
+              <p:style>
+                <a:lnRef idx="1">
+                  <a:schemeClr val="accent1"/>
+                </a:lnRef>
+                <a:fillRef idx="3">
+                  <a:schemeClr val="accent1"/>
+                </a:fillRef>
+                <a:effectRef idx="2">
+                  <a:schemeClr val="accent1"/>
+                </a:effectRef>
+                <a:fontRef idx="minor">
+                  <a:schemeClr val="lt1"/>
+                </a:fontRef>
+              </p:style>
+              <p:txBody>
+                <a:bodyPr rtlCol="0" anchor="ctr"/>
+                <a:lstStyle/>
+                <a:p>
+                  <a:pPr algn="ctr"/>
+                  <a:endParaRPr lang="en-US"/>
+                </a:p>
+              </p:txBody>
+            </p:sp>
+            <p:sp>
+              <p:nvSpPr>
+                <p:cNvPr id="13" name="Oval 12"/>
+                <p:cNvSpPr/>
+                <p:nvPr/>
+              </p:nvSpPr>
+              <p:spPr>
+                <a:xfrm>
+                  <a:off x="2977750" y="1401155"/>
+                  <a:ext cx="2431240" cy="2452023"/>
+                </a:xfrm>
+                <a:prstGeom prst="ellipse">
+                  <a:avLst/>
+                </a:prstGeom>
+                <a:blipFill rotWithShape="1">
+                  <a:blip r:embed="rId2"/>
+                  <a:stretch>
+                    <a:fillRect/>
+                  </a:stretch>
+                </a:blipFill>
+                <a:ln w="28575" cmpd="sng">
+                  <a:solidFill>
+                    <a:schemeClr val="tx1"/>
+                  </a:solidFill>
+                </a:ln>
+                <a:effectLst/>
+              </p:spPr>
+              <p:style>
+                <a:lnRef idx="1">
+                  <a:schemeClr val="accent1"/>
+                </a:lnRef>
+                <a:fillRef idx="3">
+                  <a:schemeClr val="accent1"/>
+                </a:fillRef>
+                <a:effectRef idx="2">
+                  <a:schemeClr val="accent1"/>
+                </a:effectRef>
+                <a:fontRef idx="minor">
+                  <a:schemeClr val="lt1"/>
+                </a:fontRef>
+              </p:style>
+              <p:txBody>
+                <a:bodyPr rtlCol="0" anchor="ctr"/>
+                <a:lstStyle/>
+                <a:p>
+                  <a:pPr algn="ctr"/>
+                  <a:endParaRPr lang="en-US" sz="3200" dirty="0" smtClean="0">
+                    <a:solidFill>
+                      <a:schemeClr val="tx1"/>
+                    </a:solidFill>
+                  </a:endParaRPr>
+                </a:p>
+                <a:p>
+                  <a:pPr algn="ctr"/>
+                  <a:endParaRPr lang="en-US" sz="3200" dirty="0">
+                    <a:solidFill>
+                      <a:schemeClr val="tx1"/>
+                    </a:solidFill>
+                  </a:endParaRPr>
+                </a:p>
+              </p:txBody>
+            </p:sp>
+          </p:grpSp>
+        </p:grpSp>
+        <p:sp>
+          <p:nvSpPr>
+            <p:cNvPr id="14" name="Oval 13"/>
+            <p:cNvSpPr/>
+            <p:nvPr/>
+          </p:nvSpPr>
+          <p:spPr>
+            <a:xfrm>
+              <a:off x="6935065" y="1413855"/>
+              <a:ext cx="2431240" cy="2452023"/>
+            </a:xfrm>
+            <a:prstGeom prst="ellipse">
+              <a:avLst/>
+            </a:prstGeom>
+            <a:pattFill prst="pct30">
+              <a:fgClr>
+                <a:srgbClr val="008000"/>
+              </a:fgClr>
+              <a:bgClr>
+                <a:prstClr val="white"/>
+              </a:bgClr>
+            </a:pattFill>
+            <a:ln w="28575" cmpd="sng">
+              <a:noFill/>
+            </a:ln>
+            <a:effectLst/>
+          </p:spPr>
+          <p:style>
+            <a:lnRef idx="1">
+              <a:schemeClr val="accent1"/>
+            </a:lnRef>
+            <a:fillRef idx="3">
+              <a:schemeClr val="accent1"/>
+            </a:fillRef>
+            <a:effectRef idx="2">
+              <a:schemeClr val="accent1"/>
+            </a:effectRef>
+            <a:fontRef idx="minor">
+              <a:schemeClr val="lt1"/>
+            </a:fontRef>
+          </p:style>
+          <p:txBody>
+            <a:bodyPr rtlCol="0" anchor="ctr"/>
+            <a:lstStyle/>
+            <a:p>
+              <a:pPr algn="ctr"/>
+              <a:endParaRPr lang="en-US" sz="3200" dirty="0" smtClean="0">
+                <a:solidFill>
+                  <a:schemeClr val="tx1"/>
+                </a:solidFill>
+              </a:endParaRPr>
+            </a:p>
+            <a:p>
+              <a:pPr algn="ctr"/>
+              <a:endParaRPr lang="en-US" sz="3200" dirty="0">
+                <a:solidFill>
+                  <a:schemeClr val="tx1"/>
+                </a:solidFill>
+              </a:endParaRPr>
+            </a:p>
+          </p:txBody>
+        </p:sp>
+      </p:grpSp>
+      <p:sp>
+        <p:nvSpPr>
+          <p:cNvPr id="16" name="TextBox 15"/>
+          <p:cNvSpPr txBox="1"/>
+          <p:nvPr/>
+        </p:nvSpPr>
+        <p:spPr>
+          <a:xfrm>
+            <a:off x="6083300" y="1117600"/>
+            <a:ext cx="184666" cy="369332"/>
+          </a:xfrm>
+          <a:prstGeom prst="rect">
+            <a:avLst/>
+          </a:prstGeom>
+          <a:noFill/>
+        </p:spPr>
+        <p:txBody>
+          <a:bodyPr wrap="none" rtlCol="0">
+            <a:spAutoFit/>
+          </a:bodyPr>
+          <a:lstStyle/>
+          <a:p>
+            <a:endParaRPr lang="en-US" dirty="0"/>
+          </a:p>
+        </p:txBody>
+      </p:sp>
+    </p:spTree>
+    <p:extLst>
+      <p:ext uri="{BB962C8B-B14F-4D97-AF65-F5344CB8AC3E}">
+        <p14:creationId xmlns:p14="http://schemas.microsoft.com/office/powerpoint/2010/main" val="988529708"/>
+      </p:ext>
+    </p:extLst>
+  </p:cSld>
+  <p:clrMapOvr>
+    <a:masterClrMapping/>
+  </p:clrMapOvr>
+</p:sld>
+</file>
+
 <file path=ppt/theme/theme1.xml><?xml version="1.0" encoding="utf-8"?>
 <a:theme xmlns:a="http://schemas.openxmlformats.org/drawingml/2006/main" name="Office Theme">
   <a:themeElements>

</xml_diff>